<commit_message>
Changed intro script a little.
</commit_message>
<xml_diff>
--- a/Presentation_Materials/Introduction.pptx
+++ b/Presentation_Materials/Introduction.pptx
@@ -593,7 +593,11 @@
           <a:p>
             <a:r>
               <a:rPr lang="en-US" baseline="0" dirty="0" smtClean="0"/>
-              <a:t>One of the primary responsibilities of a data scientist is to take data that is largely unintelligible in its raw form, and turn it into knowledge.  That was our primary goal in this massive data project.  Why is crime data worthy of such an effort?  By gaining a better understanding of crime, and distributing that knowledge, one can contribute to the health of society. </a:t>
+              <a:t>For our project, we decided to find a way to use the UK police database, a public database that contains information on all of the crimes in the UK, submitted by police departments.  One </a:t>
+            </a:r>
+            <a:r>
+              <a:rPr lang="en-US" baseline="0" dirty="0" smtClean="0"/>
+              <a:t>of the primary responsibilities of a data scientist is to take data that is largely unintelligible in its raw form, and turn it into knowledge.  That was our primary goal in this massive data project.  Why is crime data worthy of such an effort?  By gaining a better understanding of crime, and distributing that knowledge, one can contribute to the health of society. </a:t>
             </a:r>
           </a:p>
           <a:p>
@@ -611,8 +615,13 @@
           <a:p>
             <a:r>
               <a:rPr lang="en-US" baseline="0" dirty="0" smtClean="0"/>
-              <a:t>A full understanding of crime will also yield hypotheses for how to reduce it, paving the way for policies and programs.</a:t>
-            </a:r>
+              <a:t>A full understanding of crime will also yield hypotheses for how to reduce it, paving the way for policies and </a:t>
+            </a:r>
+            <a:r>
+              <a:rPr lang="en-US" baseline="0" dirty="0" smtClean="0"/>
+              <a:t>programs in government.</a:t>
+            </a:r>
+            <a:endParaRPr lang="en-US" baseline="0" dirty="0" smtClean="0"/>
           </a:p>
           <a:p>
             <a:endParaRPr lang="en-US" baseline="0" dirty="0" smtClean="0"/>
@@ -708,11 +717,7 @@
           <a:p>
             <a:r>
               <a:rPr lang="en-US" dirty="0" smtClean="0"/>
-              <a:t>These are the data sources that we used.  </a:t>
-            </a:r>
-            <a:r>
-              <a:rPr lang="en-US" dirty="0" smtClean="0"/>
-              <a:t>Most of them were found through googling.  The dataset that kicked it all off was the crime data.</a:t>
+              <a:t>These are the data sources that we used.  Most of them were found through googling.  The dataset that kicked it all off was the crime data.</a:t>
             </a:r>
             <a:r>
               <a:rPr lang="en-US" baseline="0" dirty="0" smtClean="0"/>
@@ -734,16 +739,13 @@
           <a:p>
             <a:r>
               <a:rPr lang="en-US" dirty="0" smtClean="0"/>
-              <a:t>The first is a UK-wide crime database that is a compilation</a:t>
-            </a:r>
-            <a:r>
-              <a:rPr lang="en-US" baseline="0" dirty="0" smtClean="0"/>
-              <a:t> of the databases from all of the country’s police departments.  From that database </a:t>
+              <a:t>The first is a UK-wide crime database </a:t>
             </a:r>
             <a:r>
               <a:rPr lang="en-US" dirty="0" smtClean="0"/>
-              <a:t>we used street-level crime data.</a:t>
-            </a:r>
+              <a:t>I already spoke of.</a:t>
+            </a:r>
+            <a:endParaRPr lang="en-US" dirty="0" smtClean="0"/>
           </a:p>
           <a:p>
             <a:endParaRPr lang="en-US" dirty="0" smtClean="0"/>
@@ -764,15 +766,7 @@
           <a:p>
             <a:r>
               <a:rPr lang="en-US" baseline="0" dirty="0" smtClean="0"/>
-              <a:t>The third contained the data required to aggregate from the street level crime data to the local authority district </a:t>
-            </a:r>
-            <a:r>
-              <a:rPr lang="en-US" baseline="0" dirty="0" smtClean="0"/>
-              <a:t>(LAD) level </a:t>
-            </a:r>
-            <a:r>
-              <a:rPr lang="en-US" baseline="0" dirty="0" smtClean="0"/>
-              <a:t>that we ended up applying for the majority of our analyses.</a:t>
+              <a:t>The third contained the data required to aggregate from the street level crime data to the local authority district (LAD) level that we ended up applying for the majority of our analyses.</a:t>
             </a:r>
           </a:p>
           <a:p>

</xml_diff>

<commit_message>
Final change, I hope
</commit_message>
<xml_diff>
--- a/Presentation_Materials/Introduction.pptx
+++ b/Presentation_Materials/Introduction.pptx
@@ -593,12 +593,29 @@
           <a:p>
             <a:r>
               <a:rPr lang="en-US" baseline="0" dirty="0" smtClean="0"/>
-              <a:t>For our project, we decided to find a way to use the UK police database, a public database that contains information on all of the crimes in the UK, submitted by police departments.  One </a:t>
+              <a:t>For our project, we decided to find a way to use the UK police database, a public database that contains information on all of the crimes in the UK, submitted by police departments. </a:t>
             </a:r>
             <a:r>
               <a:rPr lang="en-US" baseline="0" dirty="0" smtClean="0"/>
-              <a:t>of the primary responsibilities of a data scientist is to take data that is largely unintelligible in its raw form, and turn it into knowledge.  That was our primary goal in this massive data project.  Why is crime data worthy of such an effort?  By gaining a better understanding of crime, and distributing that knowledge, one can contribute to the health of society. </a:t>
-            </a:r>
+              <a:t>Our primary </a:t>
+            </a:r>
+            <a:r>
+              <a:rPr lang="en-US" baseline="0" dirty="0" smtClean="0"/>
+              <a:t>goal in this massive data </a:t>
+            </a:r>
+            <a:r>
+              <a:rPr lang="en-US" baseline="0" dirty="0" smtClean="0"/>
+              <a:t>project was that of a data scientist, to take data that is largely unintelligible in its raw form, and turn it into knowledge.  Why </a:t>
+            </a:r>
+            <a:r>
+              <a:rPr lang="en-US" baseline="0" dirty="0" smtClean="0"/>
+              <a:t>is crime data worthy of such an effort?  By gaining a better understanding of crime, and distributing that knowledge, one can contribute to the health of </a:t>
+            </a:r>
+            <a:r>
+              <a:rPr lang="en-US" baseline="0" dirty="0" smtClean="0"/>
+              <a:t>society.  Here are three ways that might happen.</a:t>
+            </a:r>
+            <a:endParaRPr lang="en-US" baseline="0" dirty="0" smtClean="0"/>
           </a:p>
           <a:p>
             <a:endParaRPr lang="en-US" baseline="0" dirty="0" smtClean="0"/>
@@ -615,13 +632,8 @@
           <a:p>
             <a:r>
               <a:rPr lang="en-US" baseline="0" dirty="0" smtClean="0"/>
-              <a:t>A full understanding of crime will also yield hypotheses for how to reduce it, paving the way for policies and </a:t>
-            </a:r>
-            <a:r>
-              <a:rPr lang="en-US" baseline="0" dirty="0" smtClean="0"/>
-              <a:t>programs in government.</a:t>
-            </a:r>
-            <a:endParaRPr lang="en-US" baseline="0" dirty="0" smtClean="0"/>
+              <a:t>A full understanding of crime will also yield hypotheses for how to reduce it, paving the way for policies and programs in government.</a:t>
+            </a:r>
           </a:p>
           <a:p>
             <a:endParaRPr lang="en-US" baseline="0" dirty="0" smtClean="0"/>
@@ -739,13 +751,8 @@
           <a:p>
             <a:r>
               <a:rPr lang="en-US" dirty="0" smtClean="0"/>
-              <a:t>The first is a UK-wide crime database </a:t>
-            </a:r>
-            <a:r>
-              <a:rPr lang="en-US" dirty="0" smtClean="0"/>
-              <a:t>I already spoke of.</a:t>
-            </a:r>
-            <a:endParaRPr lang="en-US" dirty="0" smtClean="0"/>
+              <a:t>The first is a UK-wide crime database I already spoke of.</a:t>
+            </a:r>
           </a:p>
           <a:p>
             <a:endParaRPr lang="en-US" dirty="0" smtClean="0"/>

</xml_diff>